<commit_message>
Notes and slides upto unit 5 added
</commit_message>
<xml_diff>
--- a/Unit 1.pptx
+++ b/Unit 1.pptx
@@ -531,7 +531,7 @@
           <a:p>
             <a:fld id="{5FA531DE-E7B8-4FE4-8EE1-C0B6A4CA2C83}" type="datetimeFigureOut">
               <a:rPr lang="en-US" smtClean="0"/>
-              <a:t>6/24/2025</a:t>
+              <a:t>7/3/2025</a:t>
             </a:fld>
             <a:endParaRPr lang="en-US"/>
           </a:p>
@@ -710,7 +710,7 @@
           <a:p>
             <a:fld id="{5FA531DE-E7B8-4FE4-8EE1-C0B6A4CA2C83}" type="datetimeFigureOut">
               <a:rPr lang="en-US" smtClean="0"/>
-              <a:t>6/24/2025</a:t>
+              <a:t>7/3/2025</a:t>
             </a:fld>
             <a:endParaRPr lang="en-US"/>
           </a:p>
@@ -890,7 +890,7 @@
           <a:p>
             <a:fld id="{5FA531DE-E7B8-4FE4-8EE1-C0B6A4CA2C83}" type="datetimeFigureOut">
               <a:rPr lang="en-US" smtClean="0"/>
-              <a:t>6/24/2025</a:t>
+              <a:t>7/3/2025</a:t>
             </a:fld>
             <a:endParaRPr lang="en-US"/>
           </a:p>
@@ -1060,7 +1060,7 @@
           <a:p>
             <a:fld id="{5FA531DE-E7B8-4FE4-8EE1-C0B6A4CA2C83}" type="datetimeFigureOut">
               <a:rPr lang="en-US" smtClean="0"/>
-              <a:t>6/24/2025</a:t>
+              <a:t>7/3/2025</a:t>
             </a:fld>
             <a:endParaRPr lang="en-US"/>
           </a:p>
@@ -1373,7 +1373,7 @@
           <a:p>
             <a:fld id="{5FA531DE-E7B8-4FE4-8EE1-C0B6A4CA2C83}" type="datetimeFigureOut">
               <a:rPr lang="en-US" smtClean="0"/>
-              <a:t>6/24/2025</a:t>
+              <a:t>7/3/2025</a:t>
             </a:fld>
             <a:endParaRPr lang="en-US"/>
           </a:p>
@@ -1759,7 +1759,7 @@
           <a:p>
             <a:fld id="{5FA531DE-E7B8-4FE4-8EE1-C0B6A4CA2C83}" type="datetimeFigureOut">
               <a:rPr lang="en-US" smtClean="0"/>
-              <a:t>6/24/2025</a:t>
+              <a:t>7/3/2025</a:t>
             </a:fld>
             <a:endParaRPr lang="en-US"/>
           </a:p>
@@ -2193,7 +2193,7 @@
           <a:p>
             <a:fld id="{5FA531DE-E7B8-4FE4-8EE1-C0B6A4CA2C83}" type="datetimeFigureOut">
               <a:rPr lang="en-US" smtClean="0"/>
-              <a:t>6/24/2025</a:t>
+              <a:t>7/3/2025</a:t>
             </a:fld>
             <a:endParaRPr lang="en-US"/>
           </a:p>
@@ -2311,7 +2311,7 @@
           <a:p>
             <a:fld id="{5FA531DE-E7B8-4FE4-8EE1-C0B6A4CA2C83}" type="datetimeFigureOut">
               <a:rPr lang="en-US" smtClean="0"/>
-              <a:t>6/24/2025</a:t>
+              <a:t>7/3/2025</a:t>
             </a:fld>
             <a:endParaRPr lang="en-US"/>
           </a:p>
@@ -2406,7 +2406,7 @@
           <a:p>
             <a:fld id="{5FA531DE-E7B8-4FE4-8EE1-C0B6A4CA2C83}" type="datetimeFigureOut">
               <a:rPr lang="en-US" smtClean="0"/>
-              <a:t>6/24/2025</a:t>
+              <a:t>7/3/2025</a:t>
             </a:fld>
             <a:endParaRPr lang="en-US"/>
           </a:p>
@@ -2756,7 +2756,7 @@
           <a:p>
             <a:fld id="{5FA531DE-E7B8-4FE4-8EE1-C0B6A4CA2C83}" type="datetimeFigureOut">
               <a:rPr lang="en-US" smtClean="0"/>
-              <a:t>6/24/2025</a:t>
+              <a:t>7/3/2025</a:t>
             </a:fld>
             <a:endParaRPr lang="en-US"/>
           </a:p>
@@ -3181,7 +3181,7 @@
           <a:p>
             <a:fld id="{5FA531DE-E7B8-4FE4-8EE1-C0B6A4CA2C83}" type="datetimeFigureOut">
               <a:rPr lang="en-US" smtClean="0"/>
-              <a:t>6/24/2025</a:t>
+              <a:t>7/3/2025</a:t>
             </a:fld>
             <a:endParaRPr lang="en-US"/>
           </a:p>
@@ -3462,7 +3462,7 @@
           <a:p>
             <a:fld id="{5FA531DE-E7B8-4FE4-8EE1-C0B6A4CA2C83}" type="datetimeFigureOut">
               <a:rPr lang="en-US" smtClean="0"/>
-              <a:t>6/24/2025</a:t>
+              <a:t>7/3/2025</a:t>
             </a:fld>
             <a:endParaRPr lang="en-US"/>
           </a:p>
@@ -4091,13 +4091,19 @@
           <a:lstStyle/>
           <a:p>
             <a:r>
-              <a:rPr lang="en-US" dirty="0"/>
+              <a:rPr lang="en-US" dirty="0">
+                <a:latin typeface="Times New Roman" panose="02020603050405020304" pitchFamily="18" charset="0"/>
+                <a:cs typeface="Times New Roman" panose="02020603050405020304" pitchFamily="18" charset="0"/>
+              </a:rPr>
               <a:t>Prepared by: Natabar Khatri</a:t>
             </a:r>
           </a:p>
           <a:p>
             <a:r>
-              <a:rPr lang="en-US" dirty="0"/>
+              <a:rPr lang="en-US" dirty="0">
+                <a:latin typeface="Times New Roman" panose="02020603050405020304" pitchFamily="18" charset="0"/>
+                <a:cs typeface="Times New Roman" panose="02020603050405020304" pitchFamily="18" charset="0"/>
+              </a:rPr>
               <a:t>New Summit College</a:t>
             </a:r>
           </a:p>

</xml_diff>